<commit_message>
Update before Chimera pull
</commit_message>
<xml_diff>
--- a/echolocatoR/images/echo_flowchart.pptx
+++ b/echolocatoR/images/echo_flowchart.pptx
@@ -5,10 +5,11 @@
     <p:sldMasterId id="2147483648" r:id="rId1"/>
   </p:sldMasterIdLst>
   <p:notesMasterIdLst>
-    <p:notesMasterId r:id="rId3"/>
+    <p:notesMasterId r:id="rId4"/>
   </p:notesMasterIdLst>
   <p:sldIdLst>
     <p:sldId id="258" r:id="rId2"/>
+    <p:sldId id="259" r:id="rId3"/>
   </p:sldIdLst>
   <p:sldSz cx="12192000" cy="6858000"/>
   <p:notesSz cx="6858000" cy="9144000"/>
@@ -197,7 +198,7 @@
           <a:p>
             <a:fld id="{9117DA4B-D188-F549-A442-E35D4CF10A4E}" type="datetimeFigureOut">
               <a:rPr lang="en-US" smtClean="0"/>
-              <a:t>4/26/19</a:t>
+              <a:t>6/21/19</a:t>
             </a:fld>
             <a:endParaRPr lang="en-US"/>
           </a:p>
@@ -548,6 +549,90 @@
 </p:notes>
 </file>
 
+<file path=ppt/notesSlides/notesSlide2.xml><?xml version="1.0" encoding="utf-8"?>
+<p:notes xmlns:a="http://schemas.openxmlformats.org/drawingml/2006/main" xmlns:r="http://schemas.openxmlformats.org/officeDocument/2006/relationships" xmlns:p="http://schemas.openxmlformats.org/presentationml/2006/main">
+  <p:cSld>
+    <p:spTree>
+      <p:nvGrpSpPr>
+        <p:cNvPr id="1" name=""/>
+        <p:cNvGrpSpPr/>
+        <p:nvPr/>
+      </p:nvGrpSpPr>
+      <p:grpSpPr>
+        <a:xfrm>
+          <a:off x="0" y="0"/>
+          <a:ext cx="0" cy="0"/>
+          <a:chOff x="0" y="0"/>
+          <a:chExt cx="0" cy="0"/>
+        </a:xfrm>
+      </p:grpSpPr>
+      <p:sp>
+        <p:nvSpPr>
+          <p:cNvPr id="2" name="Slide Image Placeholder 1"/>
+          <p:cNvSpPr>
+            <a:spLocks noGrp="1" noRot="1" noChangeAspect="1"/>
+          </p:cNvSpPr>
+          <p:nvPr>
+            <p:ph type="sldImg"/>
+          </p:nvPr>
+        </p:nvSpPr>
+        <p:spPr/>
+      </p:sp>
+      <p:sp>
+        <p:nvSpPr>
+          <p:cNvPr id="3" name="Notes Placeholder 2"/>
+          <p:cNvSpPr>
+            <a:spLocks noGrp="1"/>
+          </p:cNvSpPr>
+          <p:nvPr>
+            <p:ph type="body" idx="1"/>
+          </p:nvPr>
+        </p:nvSpPr>
+        <p:spPr/>
+        <p:txBody>
+          <a:bodyPr/>
+          <a:lstStyle/>
+          <a:p>
+            <a:endParaRPr lang="en-US" dirty="0"/>
+          </a:p>
+        </p:txBody>
+      </p:sp>
+      <p:sp>
+        <p:nvSpPr>
+          <p:cNvPr id="4" name="Slide Number Placeholder 3"/>
+          <p:cNvSpPr>
+            <a:spLocks noGrp="1"/>
+          </p:cNvSpPr>
+          <p:nvPr>
+            <p:ph type="sldNum" sz="quarter" idx="5"/>
+          </p:nvPr>
+        </p:nvSpPr>
+        <p:spPr/>
+        <p:txBody>
+          <a:bodyPr/>
+          <a:lstStyle/>
+          <a:p>
+            <a:fld id="{C13FF32D-227C-564F-9511-20A0BF26C8C8}" type="slidenum">
+              <a:rPr lang="en-US" smtClean="0"/>
+              <a:t>2</a:t>
+            </a:fld>
+            <a:endParaRPr lang="en-US"/>
+          </a:p>
+        </p:txBody>
+      </p:sp>
+    </p:spTree>
+    <p:extLst>
+      <p:ext uri="{BB962C8B-B14F-4D97-AF65-F5344CB8AC3E}">
+        <p14:creationId xmlns:p14="http://schemas.microsoft.com/office/powerpoint/2010/main" val="128425698"/>
+      </p:ext>
+    </p:extLst>
+  </p:cSld>
+  <p:clrMapOvr>
+    <a:masterClrMapping/>
+  </p:clrMapOvr>
+</p:notes>
+</file>
+
 <file path=ppt/slideLayouts/slideLayout1.xml><?xml version="1.0" encoding="utf-8"?>
 <p:sldLayout xmlns:a="http://schemas.openxmlformats.org/drawingml/2006/main" xmlns:r="http://schemas.openxmlformats.org/officeDocument/2006/relationships" xmlns:p="http://schemas.openxmlformats.org/presentationml/2006/main" type="title" preserve="1">
   <p:cSld name="Title Slide">
@@ -695,7 +780,7 @@
           <a:p>
             <a:fld id="{8FBCCD43-9D30-C74A-A7BB-F2658EEDAEAB}" type="datetimeFigureOut">
               <a:rPr lang="en-US" smtClean="0"/>
-              <a:t>4/26/19</a:t>
+              <a:t>6/21/19</a:t>
             </a:fld>
             <a:endParaRPr lang="en-US"/>
           </a:p>
@@ -893,7 +978,7 @@
           <a:p>
             <a:fld id="{8FBCCD43-9D30-C74A-A7BB-F2658EEDAEAB}" type="datetimeFigureOut">
               <a:rPr lang="en-US" smtClean="0"/>
-              <a:t>4/26/19</a:t>
+              <a:t>6/21/19</a:t>
             </a:fld>
             <a:endParaRPr lang="en-US"/>
           </a:p>
@@ -1101,7 +1186,7 @@
           <a:p>
             <a:fld id="{8FBCCD43-9D30-C74A-A7BB-F2658EEDAEAB}" type="datetimeFigureOut">
               <a:rPr lang="en-US" smtClean="0"/>
-              <a:t>4/26/19</a:t>
+              <a:t>6/21/19</a:t>
             </a:fld>
             <a:endParaRPr lang="en-US"/>
           </a:p>
@@ -1299,7 +1384,7 @@
           <a:p>
             <a:fld id="{8FBCCD43-9D30-C74A-A7BB-F2658EEDAEAB}" type="datetimeFigureOut">
               <a:rPr lang="en-US" smtClean="0"/>
-              <a:t>4/26/19</a:t>
+              <a:t>6/21/19</a:t>
             </a:fld>
             <a:endParaRPr lang="en-US"/>
           </a:p>
@@ -1574,7 +1659,7 @@
           <a:p>
             <a:fld id="{8FBCCD43-9D30-C74A-A7BB-F2658EEDAEAB}" type="datetimeFigureOut">
               <a:rPr lang="en-US" smtClean="0"/>
-              <a:t>4/26/19</a:t>
+              <a:t>6/21/19</a:t>
             </a:fld>
             <a:endParaRPr lang="en-US"/>
           </a:p>
@@ -1839,7 +1924,7 @@
           <a:p>
             <a:fld id="{8FBCCD43-9D30-C74A-A7BB-F2658EEDAEAB}" type="datetimeFigureOut">
               <a:rPr lang="en-US" smtClean="0"/>
-              <a:t>4/26/19</a:t>
+              <a:t>6/21/19</a:t>
             </a:fld>
             <a:endParaRPr lang="en-US"/>
           </a:p>
@@ -2251,7 +2336,7 @@
           <a:p>
             <a:fld id="{8FBCCD43-9D30-C74A-A7BB-F2658EEDAEAB}" type="datetimeFigureOut">
               <a:rPr lang="en-US" smtClean="0"/>
-              <a:t>4/26/19</a:t>
+              <a:t>6/21/19</a:t>
             </a:fld>
             <a:endParaRPr lang="en-US"/>
           </a:p>
@@ -2392,7 +2477,7 @@
           <a:p>
             <a:fld id="{8FBCCD43-9D30-C74A-A7BB-F2658EEDAEAB}" type="datetimeFigureOut">
               <a:rPr lang="en-US" smtClean="0"/>
-              <a:t>4/26/19</a:t>
+              <a:t>6/21/19</a:t>
             </a:fld>
             <a:endParaRPr lang="en-US"/>
           </a:p>
@@ -2505,7 +2590,7 @@
           <a:p>
             <a:fld id="{8FBCCD43-9D30-C74A-A7BB-F2658EEDAEAB}" type="datetimeFigureOut">
               <a:rPr lang="en-US" smtClean="0"/>
-              <a:t>4/26/19</a:t>
+              <a:t>6/21/19</a:t>
             </a:fld>
             <a:endParaRPr lang="en-US"/>
           </a:p>
@@ -2816,7 +2901,7 @@
           <a:p>
             <a:fld id="{8FBCCD43-9D30-C74A-A7BB-F2658EEDAEAB}" type="datetimeFigureOut">
               <a:rPr lang="en-US" smtClean="0"/>
-              <a:t>4/26/19</a:t>
+              <a:t>6/21/19</a:t>
             </a:fld>
             <a:endParaRPr lang="en-US"/>
           </a:p>
@@ -3104,7 +3189,7 @@
           <a:p>
             <a:fld id="{8FBCCD43-9D30-C74A-A7BB-F2658EEDAEAB}" type="datetimeFigureOut">
               <a:rPr lang="en-US" smtClean="0"/>
-              <a:t>4/26/19</a:t>
+              <a:t>6/21/19</a:t>
             </a:fld>
             <a:endParaRPr lang="en-US"/>
           </a:p>
@@ -3345,7 +3430,7 @@
           <a:p>
             <a:fld id="{8FBCCD43-9D30-C74A-A7BB-F2658EEDAEAB}" type="datetimeFigureOut">
               <a:rPr lang="en-US" smtClean="0"/>
-              <a:t>4/26/19</a:t>
+              <a:t>6/21/19</a:t>
             </a:fld>
             <a:endParaRPr lang="en-US"/>
           </a:p>
@@ -4066,6 +4151,96 @@
     <p:extLst>
       <p:ext uri="{BB962C8B-B14F-4D97-AF65-F5344CB8AC3E}">
         <p14:creationId xmlns:p14="http://schemas.microsoft.com/office/powerpoint/2010/main" val="2110349292"/>
+      </p:ext>
+    </p:extLst>
+  </p:cSld>
+  <p:clrMapOvr>
+    <a:masterClrMapping/>
+  </p:clrMapOvr>
+</p:sld>
+</file>
+
+<file path=ppt/slides/slide2.xml><?xml version="1.0" encoding="utf-8"?>
+<p:sld xmlns:a="http://schemas.openxmlformats.org/drawingml/2006/main" xmlns:r="http://schemas.openxmlformats.org/officeDocument/2006/relationships" xmlns:p="http://schemas.openxmlformats.org/presentationml/2006/main">
+  <p:cSld>
+    <p:spTree>
+      <p:nvGrpSpPr>
+        <p:cNvPr id="1" name=""/>
+        <p:cNvGrpSpPr/>
+        <p:nvPr/>
+      </p:nvGrpSpPr>
+      <p:grpSpPr>
+        <a:xfrm>
+          <a:off x="0" y="0"/>
+          <a:ext cx="0" cy="0"/>
+          <a:chOff x="0" y="0"/>
+          <a:chExt cx="0" cy="0"/>
+        </a:xfrm>
+      </p:grpSpPr>
+      <mc:AlternateContent xmlns:mc="http://schemas.openxmlformats.org/markup-compatibility/2006">
+        <mc:Choice xmlns:we="http://schemas.microsoft.com/office/webextensions/webextension/2010/11" xmlns:pca="http://schemas.microsoft.com/office/powerpoint/2013/contentapp" Requires="we pca">
+          <p:graphicFrame>
+            <p:nvGraphicFramePr>
+              <p:cNvPr id="2" name="Add-in 1">
+                <a:extLst>
+                  <a:ext uri="{FF2B5EF4-FFF2-40B4-BE49-F238E27FC236}">
+                    <a16:creationId xmlns:a16="http://schemas.microsoft.com/office/drawing/2014/main" id="{6AD51134-BB08-C94B-822C-B78FCC72B91A}"/>
+                  </a:ext>
+                </a:extLst>
+              </p:cNvPr>
+              <p:cNvGraphicFramePr>
+                <a:graphicFrameLocks noGrp="1"/>
+              </p:cNvGraphicFramePr>
+              <p:nvPr/>
+            </p:nvGraphicFramePr>
+            <p:xfrm>
+              <a:off x="-63500" y="-1016000"/>
+              <a:ext cx="12319000" cy="8890000"/>
+            </p:xfrm>
+            <a:graphic>
+              <a:graphicData uri="http://schemas.microsoft.com/office/webextensions/webextension/2010/11">
+                <we:webextensionref xmlns:we="http://schemas.microsoft.com/office/webextensions/webextension/2010/11" xmlns:r="http://schemas.openxmlformats.org/officeDocument/2006/relationships" r:id="rId3"/>
+              </a:graphicData>
+            </a:graphic>
+          </p:graphicFrame>
+        </mc:Choice>
+        <mc:Fallback>
+          <p:pic>
+            <p:nvPicPr>
+              <p:cNvPr id="2" name="Add-in 1">
+                <a:extLst>
+                  <a:ext uri="{FF2B5EF4-FFF2-40B4-BE49-F238E27FC236}">
+                    <a16:creationId xmlns:a16="http://schemas.microsoft.com/office/drawing/2014/main" id="{6AD51134-BB08-C94B-822C-B78FCC72B91A}"/>
+                  </a:ext>
+                </a:extLst>
+              </p:cNvPr>
+              <p:cNvPicPr>
+                <a:picLocks noGrp="1" noRot="1" noChangeAspect="1" noMove="1" noResize="1" noEditPoints="1" noAdjustHandles="1" noChangeArrowheads="1" noChangeShapeType="1"/>
+              </p:cNvPicPr>
+              <p:nvPr/>
+            </p:nvPicPr>
+            <p:blipFill>
+              <a:blip r:embed="rId4"/>
+              <a:stretch>
+                <a:fillRect/>
+              </a:stretch>
+            </p:blipFill>
+            <p:spPr>
+              <a:xfrm>
+                <a:off x="-63500" y="-1016000"/>
+                <a:ext cx="12319000" cy="8890000"/>
+              </a:xfrm>
+              <a:prstGeom prst="rect">
+                <a:avLst/>
+              </a:prstGeom>
+            </p:spPr>
+          </p:pic>
+        </mc:Fallback>
+      </mc:AlternateContent>
+    </p:spTree>
+    <p:extLst>
+      <p:ext uri="{BB962C8B-B14F-4D97-AF65-F5344CB8AC3E}">
+        <p14:creationId xmlns:p14="http://schemas.microsoft.com/office/powerpoint/2010/main" val="55440202"/>
       </p:ext>
     </p:extLst>
   </p:cSld>
@@ -4731,4 +4906,16 @@
   <we:bindings/>
   <we:snapshot xmlns:r="http://schemas.openxmlformats.org/officeDocument/2006/relationships" r:embed="rId1"/>
 </we:webextension>
+</file>
+
+<file path=ppt/webextensions/webextension6.xml><?xml version="1.0" encoding="utf-8"?>
+<we:webextension xmlns:we="http://schemas.microsoft.com/office/webextensions/webextension/2010/11" id="{1B6455D8-4EA3-A340-8CD6-E45155F3CCD8}">
+  <we:reference id="wa104380117" version="1.0.0.0" store="en-US" storeType="OMEX"/>
+  <we:alternateReferences>
+    <we:reference id="wa104380117" version="1.0.0.0" store="wa104380117" storeType="OMEX"/>
+  </we:alternateReferences>
+  <we:properties/>
+  <we:bindings/>
+  <we:snapshot xmlns:r="http://schemas.openxmlformats.org/officeDocument/2006/relationships" r:embed="rId1"/>
+</we:webextension>
 </file>
</xml_diff>

<commit_message>
Delete PAINTOR annot files; Add fGWAS
</commit_message>
<xml_diff>
--- a/echolocatoR/images/echo_flowchart.pptx
+++ b/echolocatoR/images/echo_flowchart.pptx
@@ -198,7 +198,7 @@
           <a:p>
             <a:fld id="{9117DA4B-D188-F549-A442-E35D4CF10A4E}" type="datetimeFigureOut">
               <a:rPr lang="en-US" smtClean="0"/>
-              <a:t>6/21/19</a:t>
+              <a:t>7/18/19</a:t>
             </a:fld>
             <a:endParaRPr lang="en-US"/>
           </a:p>
@@ -509,6 +509,7 @@
           <a:bodyPr/>
           <a:lstStyle/>
           <a:p>
+            <a:pPr algn="r"/>
             <a:endParaRPr lang="en-US" dirty="0"/>
           </a:p>
         </p:txBody>
@@ -540,90 +541,6 @@
     <p:extLst>
       <p:ext uri="{BB962C8B-B14F-4D97-AF65-F5344CB8AC3E}">
         <p14:creationId xmlns:p14="http://schemas.microsoft.com/office/powerpoint/2010/main" val="2522624781"/>
-      </p:ext>
-    </p:extLst>
-  </p:cSld>
-  <p:clrMapOvr>
-    <a:masterClrMapping/>
-  </p:clrMapOvr>
-</p:notes>
-</file>
-
-<file path=ppt/notesSlides/notesSlide2.xml><?xml version="1.0" encoding="utf-8"?>
-<p:notes xmlns:a="http://schemas.openxmlformats.org/drawingml/2006/main" xmlns:r="http://schemas.openxmlformats.org/officeDocument/2006/relationships" xmlns:p="http://schemas.openxmlformats.org/presentationml/2006/main">
-  <p:cSld>
-    <p:spTree>
-      <p:nvGrpSpPr>
-        <p:cNvPr id="1" name=""/>
-        <p:cNvGrpSpPr/>
-        <p:nvPr/>
-      </p:nvGrpSpPr>
-      <p:grpSpPr>
-        <a:xfrm>
-          <a:off x="0" y="0"/>
-          <a:ext cx="0" cy="0"/>
-          <a:chOff x="0" y="0"/>
-          <a:chExt cx="0" cy="0"/>
-        </a:xfrm>
-      </p:grpSpPr>
-      <p:sp>
-        <p:nvSpPr>
-          <p:cNvPr id="2" name="Slide Image Placeholder 1"/>
-          <p:cNvSpPr>
-            <a:spLocks noGrp="1" noRot="1" noChangeAspect="1"/>
-          </p:cNvSpPr>
-          <p:nvPr>
-            <p:ph type="sldImg"/>
-          </p:nvPr>
-        </p:nvSpPr>
-        <p:spPr/>
-      </p:sp>
-      <p:sp>
-        <p:nvSpPr>
-          <p:cNvPr id="3" name="Notes Placeholder 2"/>
-          <p:cNvSpPr>
-            <a:spLocks noGrp="1"/>
-          </p:cNvSpPr>
-          <p:nvPr>
-            <p:ph type="body" idx="1"/>
-          </p:nvPr>
-        </p:nvSpPr>
-        <p:spPr/>
-        <p:txBody>
-          <a:bodyPr/>
-          <a:lstStyle/>
-          <a:p>
-            <a:endParaRPr lang="en-US" dirty="0"/>
-          </a:p>
-        </p:txBody>
-      </p:sp>
-      <p:sp>
-        <p:nvSpPr>
-          <p:cNvPr id="4" name="Slide Number Placeholder 3"/>
-          <p:cNvSpPr>
-            <a:spLocks noGrp="1"/>
-          </p:cNvSpPr>
-          <p:nvPr>
-            <p:ph type="sldNum" sz="quarter" idx="5"/>
-          </p:nvPr>
-        </p:nvSpPr>
-        <p:spPr/>
-        <p:txBody>
-          <a:bodyPr/>
-          <a:lstStyle/>
-          <a:p>
-            <a:fld id="{C13FF32D-227C-564F-9511-20A0BF26C8C8}" type="slidenum">
-              <a:rPr lang="en-US" smtClean="0"/>
-              <a:t>2</a:t>
-            </a:fld>
-            <a:endParaRPr lang="en-US"/>
-          </a:p>
-        </p:txBody>
-      </p:sp>
-    </p:spTree>
-    <p:extLst>
-      <p:ext uri="{BB962C8B-B14F-4D97-AF65-F5344CB8AC3E}">
-        <p14:creationId xmlns:p14="http://schemas.microsoft.com/office/powerpoint/2010/main" val="128425698"/>
       </p:ext>
     </p:extLst>
   </p:cSld>
@@ -780,7 +697,7 @@
           <a:p>
             <a:fld id="{8FBCCD43-9D30-C74A-A7BB-F2658EEDAEAB}" type="datetimeFigureOut">
               <a:rPr lang="en-US" smtClean="0"/>
-              <a:t>6/21/19</a:t>
+              <a:t>7/18/19</a:t>
             </a:fld>
             <a:endParaRPr lang="en-US"/>
           </a:p>
@@ -978,7 +895,7 @@
           <a:p>
             <a:fld id="{8FBCCD43-9D30-C74A-A7BB-F2658EEDAEAB}" type="datetimeFigureOut">
               <a:rPr lang="en-US" smtClean="0"/>
-              <a:t>6/21/19</a:t>
+              <a:t>7/18/19</a:t>
             </a:fld>
             <a:endParaRPr lang="en-US"/>
           </a:p>
@@ -1186,7 +1103,7 @@
           <a:p>
             <a:fld id="{8FBCCD43-9D30-C74A-A7BB-F2658EEDAEAB}" type="datetimeFigureOut">
               <a:rPr lang="en-US" smtClean="0"/>
-              <a:t>6/21/19</a:t>
+              <a:t>7/18/19</a:t>
             </a:fld>
             <a:endParaRPr lang="en-US"/>
           </a:p>
@@ -1384,7 +1301,7 @@
           <a:p>
             <a:fld id="{8FBCCD43-9D30-C74A-A7BB-F2658EEDAEAB}" type="datetimeFigureOut">
               <a:rPr lang="en-US" smtClean="0"/>
-              <a:t>6/21/19</a:t>
+              <a:t>7/18/19</a:t>
             </a:fld>
             <a:endParaRPr lang="en-US"/>
           </a:p>
@@ -1659,7 +1576,7 @@
           <a:p>
             <a:fld id="{8FBCCD43-9D30-C74A-A7BB-F2658EEDAEAB}" type="datetimeFigureOut">
               <a:rPr lang="en-US" smtClean="0"/>
-              <a:t>6/21/19</a:t>
+              <a:t>7/18/19</a:t>
             </a:fld>
             <a:endParaRPr lang="en-US"/>
           </a:p>
@@ -1924,7 +1841,7 @@
           <a:p>
             <a:fld id="{8FBCCD43-9D30-C74A-A7BB-F2658EEDAEAB}" type="datetimeFigureOut">
               <a:rPr lang="en-US" smtClean="0"/>
-              <a:t>6/21/19</a:t>
+              <a:t>7/18/19</a:t>
             </a:fld>
             <a:endParaRPr lang="en-US"/>
           </a:p>
@@ -2336,7 +2253,7 @@
           <a:p>
             <a:fld id="{8FBCCD43-9D30-C74A-A7BB-F2658EEDAEAB}" type="datetimeFigureOut">
               <a:rPr lang="en-US" smtClean="0"/>
-              <a:t>6/21/19</a:t>
+              <a:t>7/18/19</a:t>
             </a:fld>
             <a:endParaRPr lang="en-US"/>
           </a:p>
@@ -2477,7 +2394,7 @@
           <a:p>
             <a:fld id="{8FBCCD43-9D30-C74A-A7BB-F2658EEDAEAB}" type="datetimeFigureOut">
               <a:rPr lang="en-US" smtClean="0"/>
-              <a:t>6/21/19</a:t>
+              <a:t>7/18/19</a:t>
             </a:fld>
             <a:endParaRPr lang="en-US"/>
           </a:p>
@@ -2590,7 +2507,7 @@
           <a:p>
             <a:fld id="{8FBCCD43-9D30-C74A-A7BB-F2658EEDAEAB}" type="datetimeFigureOut">
               <a:rPr lang="en-US" smtClean="0"/>
-              <a:t>6/21/19</a:t>
+              <a:t>7/18/19</a:t>
             </a:fld>
             <a:endParaRPr lang="en-US"/>
           </a:p>
@@ -2901,7 +2818,7 @@
           <a:p>
             <a:fld id="{8FBCCD43-9D30-C74A-A7BB-F2658EEDAEAB}" type="datetimeFigureOut">
               <a:rPr lang="en-US" smtClean="0"/>
-              <a:t>6/21/19</a:t>
+              <a:t>7/18/19</a:t>
             </a:fld>
             <a:endParaRPr lang="en-US"/>
           </a:p>
@@ -3189,7 +3106,7 @@
           <a:p>
             <a:fld id="{8FBCCD43-9D30-C74A-A7BB-F2658EEDAEAB}" type="datetimeFigureOut">
               <a:rPr lang="en-US" smtClean="0"/>
-              <a:t>6/21/19</a:t>
+              <a:t>7/18/19</a:t>
             </a:fld>
             <a:endParaRPr lang="en-US"/>
           </a:p>
@@ -3430,7 +3347,7 @@
           <a:p>
             <a:fld id="{8FBCCD43-9D30-C74A-A7BB-F2658EEDAEAB}" type="datetimeFigureOut">
               <a:rPr lang="en-US" smtClean="0"/>
-              <a:t>6/21/19</a:t>
+              <a:t>7/18/19</a:t>
             </a:fld>
             <a:endParaRPr lang="en-US"/>
           </a:p>
@@ -4147,44 +4064,14 @@
           </p:pic>
         </mc:Fallback>
       </mc:AlternateContent>
-    </p:spTree>
-    <p:extLst>
-      <p:ext uri="{BB962C8B-B14F-4D97-AF65-F5344CB8AC3E}">
-        <p14:creationId xmlns:p14="http://schemas.microsoft.com/office/powerpoint/2010/main" val="2110349292"/>
-      </p:ext>
-    </p:extLst>
-  </p:cSld>
-  <p:clrMapOvr>
-    <a:masterClrMapping/>
-  </p:clrMapOvr>
-</p:sld>
-</file>
-
-<file path=ppt/slides/slide2.xml><?xml version="1.0" encoding="utf-8"?>
-<p:sld xmlns:a="http://schemas.openxmlformats.org/drawingml/2006/main" xmlns:r="http://schemas.openxmlformats.org/officeDocument/2006/relationships" xmlns:p="http://schemas.openxmlformats.org/presentationml/2006/main">
-  <p:cSld>
-    <p:spTree>
-      <p:nvGrpSpPr>
-        <p:cNvPr id="1" name=""/>
-        <p:cNvGrpSpPr/>
-        <p:nvPr/>
-      </p:nvGrpSpPr>
-      <p:grpSpPr>
-        <a:xfrm>
-          <a:off x="0" y="0"/>
-          <a:ext cx="0" cy="0"/>
-          <a:chOff x="0" y="0"/>
-          <a:chExt cx="0" cy="0"/>
-        </a:xfrm>
-      </p:grpSpPr>
       <mc:AlternateContent xmlns:mc="http://schemas.openxmlformats.org/markup-compatibility/2006">
         <mc:Choice xmlns:we="http://schemas.microsoft.com/office/webextensions/webextension/2010/11" xmlns:pca="http://schemas.microsoft.com/office/powerpoint/2013/contentapp" Requires="we pca">
           <p:graphicFrame>
             <p:nvGraphicFramePr>
-              <p:cNvPr id="2" name="Add-in 1">
+              <p:cNvPr id="7" name="Add-in 6">
                 <a:extLst>
                   <a:ext uri="{FF2B5EF4-FFF2-40B4-BE49-F238E27FC236}">
-                    <a16:creationId xmlns:a16="http://schemas.microsoft.com/office/drawing/2014/main" id="{6AD51134-BB08-C94B-822C-B78FCC72B91A}"/>
+                    <a16:creationId xmlns:a16="http://schemas.microsoft.com/office/drawing/2014/main" id="{05EC99F9-DB9B-6F40-9885-7ED4AE327CA4}"/>
                   </a:ext>
                 </a:extLst>
               </p:cNvPr>
@@ -4199,7 +4086,7 @@
             </p:xfrm>
             <a:graphic>
               <a:graphicData uri="http://schemas.microsoft.com/office/webextensions/webextension/2010/11">
-                <we:webextensionref xmlns:we="http://schemas.microsoft.com/office/webextensions/webextension/2010/11" xmlns:r="http://schemas.openxmlformats.org/officeDocument/2006/relationships" r:id="rId3"/>
+                <we:webextensionref xmlns:we="http://schemas.microsoft.com/office/webextensions/webextension/2010/11" xmlns:r="http://schemas.openxmlformats.org/officeDocument/2006/relationships" r:id="rId10"/>
               </a:graphicData>
             </a:graphic>
           </p:graphicFrame>
@@ -4207,10 +4094,10 @@
         <mc:Fallback>
           <p:pic>
             <p:nvPicPr>
-              <p:cNvPr id="2" name="Add-in 1">
+              <p:cNvPr id="7" name="Add-in 6">
                 <a:extLst>
                   <a:ext uri="{FF2B5EF4-FFF2-40B4-BE49-F238E27FC236}">
-                    <a16:creationId xmlns:a16="http://schemas.microsoft.com/office/drawing/2014/main" id="{6AD51134-BB08-C94B-822C-B78FCC72B91A}"/>
+                    <a16:creationId xmlns:a16="http://schemas.microsoft.com/office/drawing/2014/main" id="{05EC99F9-DB9B-6F40-9885-7ED4AE327CA4}"/>
                   </a:ext>
                 </a:extLst>
               </p:cNvPr>
@@ -4220,7 +4107,7 @@
               <p:nvPr/>
             </p:nvPicPr>
             <p:blipFill>
-              <a:blip r:embed="rId4"/>
+              <a:blip r:embed="rId11"/>
               <a:stretch>
                 <a:fillRect/>
               </a:stretch>
@@ -4240,7 +4127,196 @@
     </p:spTree>
     <p:extLst>
       <p:ext uri="{BB962C8B-B14F-4D97-AF65-F5344CB8AC3E}">
-        <p14:creationId xmlns:p14="http://schemas.microsoft.com/office/powerpoint/2010/main" val="55440202"/>
+        <p14:creationId xmlns:p14="http://schemas.microsoft.com/office/powerpoint/2010/main" val="2110349292"/>
+      </p:ext>
+    </p:extLst>
+  </p:cSld>
+  <p:clrMapOvr>
+    <a:masterClrMapping/>
+  </p:clrMapOvr>
+</p:sld>
+</file>
+
+<file path=ppt/slides/slide2.xml><?xml version="1.0" encoding="utf-8"?>
+<p:sld xmlns:a="http://schemas.openxmlformats.org/drawingml/2006/main" xmlns:r="http://schemas.openxmlformats.org/officeDocument/2006/relationships" xmlns:p="http://schemas.openxmlformats.org/presentationml/2006/main">
+  <p:cSld>
+    <p:bg>
+      <p:bgPr>
+        <a:solidFill>
+          <a:schemeClr val="bg1"/>
+        </a:solidFill>
+        <a:effectLst/>
+      </p:bgPr>
+    </p:bg>
+    <p:spTree>
+      <p:nvGrpSpPr>
+        <p:cNvPr id="1" name=""/>
+        <p:cNvGrpSpPr/>
+        <p:nvPr/>
+      </p:nvGrpSpPr>
+      <p:grpSpPr>
+        <a:xfrm>
+          <a:off x="0" y="0"/>
+          <a:ext cx="0" cy="0"/>
+          <a:chOff x="0" y="0"/>
+          <a:chExt cx="0" cy="0"/>
+        </a:xfrm>
+      </p:grpSpPr>
+      <p:sp>
+        <p:nvSpPr>
+          <p:cNvPr id="5" name="Freeform 4">
+            <a:extLst>
+              <a:ext uri="{FF2B5EF4-FFF2-40B4-BE49-F238E27FC236}">
+                <a16:creationId xmlns:a16="http://schemas.microsoft.com/office/drawing/2014/main" id="{C966E771-E591-C842-895D-E4B86801B117}"/>
+              </a:ext>
+            </a:extLst>
+          </p:cNvPr>
+          <p:cNvSpPr/>
+          <p:nvPr/>
+        </p:nvSpPr>
+        <p:spPr>
+          <a:xfrm rot="16200000">
+            <a:off x="1752600" y="-1308100"/>
+            <a:ext cx="6858000" cy="9474200"/>
+          </a:xfrm>
+          <a:custGeom>
+            <a:avLst/>
+            <a:gdLst>
+              <a:gd name="connsiteX0" fmla="*/ 5524500 w 5524500"/>
+              <a:gd name="connsiteY0" fmla="*/ 1181100 h 8890000"/>
+              <a:gd name="connsiteX1" fmla="*/ 5524500 w 5524500"/>
+              <a:gd name="connsiteY1" fmla="*/ 8890000 h 8890000"/>
+              <a:gd name="connsiteX2" fmla="*/ 0 w 5524500"/>
+              <a:gd name="connsiteY2" fmla="*/ 8890000 h 8890000"/>
+              <a:gd name="connsiteX3" fmla="*/ 0 w 5524500"/>
+              <a:gd name="connsiteY3" fmla="*/ 1181100 h 8890000"/>
+              <a:gd name="connsiteX4" fmla="*/ 1181100 w 5524500"/>
+              <a:gd name="connsiteY4" fmla="*/ 1181100 h 8890000"/>
+              <a:gd name="connsiteX5" fmla="*/ 2933700 w 5524500"/>
+              <a:gd name="connsiteY5" fmla="*/ 0 h 8890000"/>
+              <a:gd name="connsiteX6" fmla="*/ 4686300 w 5524500"/>
+              <a:gd name="connsiteY6" fmla="*/ 1181100 h 8890000"/>
+            </a:gdLst>
+            <a:ahLst/>
+            <a:cxnLst>
+              <a:cxn ang="0">
+                <a:pos x="connsiteX0" y="connsiteY0"/>
+              </a:cxn>
+              <a:cxn ang="0">
+                <a:pos x="connsiteX1" y="connsiteY1"/>
+              </a:cxn>
+              <a:cxn ang="0">
+                <a:pos x="connsiteX2" y="connsiteY2"/>
+              </a:cxn>
+              <a:cxn ang="0">
+                <a:pos x="connsiteX3" y="connsiteY3"/>
+              </a:cxn>
+              <a:cxn ang="0">
+                <a:pos x="connsiteX4" y="connsiteY4"/>
+              </a:cxn>
+              <a:cxn ang="0">
+                <a:pos x="connsiteX5" y="connsiteY5"/>
+              </a:cxn>
+              <a:cxn ang="0">
+                <a:pos x="connsiteX6" y="connsiteY6"/>
+              </a:cxn>
+            </a:cxnLst>
+            <a:rect l="l" t="t" r="r" b="b"/>
+            <a:pathLst>
+              <a:path w="5524500" h="8890000">
+                <a:moveTo>
+                  <a:pt x="5524500" y="1181100"/>
+                </a:moveTo>
+                <a:lnTo>
+                  <a:pt x="5524500" y="8890000"/>
+                </a:lnTo>
+                <a:lnTo>
+                  <a:pt x="0" y="8890000"/>
+                </a:lnTo>
+                <a:lnTo>
+                  <a:pt x="0" y="1181100"/>
+                </a:lnTo>
+                <a:lnTo>
+                  <a:pt x="1181100" y="1181100"/>
+                </a:lnTo>
+                <a:lnTo>
+                  <a:pt x="2933700" y="0"/>
+                </a:lnTo>
+                <a:lnTo>
+                  <a:pt x="4686300" y="1181100"/>
+                </a:lnTo>
+                <a:close/>
+              </a:path>
+            </a:pathLst>
+          </a:custGeom>
+          <a:gradFill flip="none" rotWithShape="1">
+            <a:gsLst>
+              <a:gs pos="33000">
+                <a:schemeClr val="tx1">
+                  <a:lumMod val="0"/>
+                </a:schemeClr>
+              </a:gs>
+              <a:gs pos="66000">
+                <a:srgbClr val="C0C0C0">
+                  <a:alpha val="0"/>
+                </a:srgbClr>
+              </a:gs>
+              <a:gs pos="38000">
+                <a:srgbClr val="808080"/>
+              </a:gs>
+              <a:gs pos="44000">
+                <a:schemeClr val="tx1">
+                  <a:alpha val="31000"/>
+                </a:schemeClr>
+              </a:gs>
+              <a:gs pos="88000">
+                <a:schemeClr val="bg1"/>
+              </a:gs>
+              <a:gs pos="78000">
+                <a:srgbClr val="E0E0E0"/>
+              </a:gs>
+              <a:gs pos="53000">
+                <a:schemeClr val="bg1"/>
+              </a:gs>
+            </a:gsLst>
+            <a:path path="circle">
+              <a:fillToRect l="100000" b="100000"/>
+            </a:path>
+            <a:tileRect/>
+          </a:gradFill>
+          <a:ln>
+            <a:noFill/>
+          </a:ln>
+        </p:spPr>
+        <p:style>
+          <a:lnRef idx="2">
+            <a:schemeClr val="accent1">
+              <a:shade val="50000"/>
+            </a:schemeClr>
+          </a:lnRef>
+          <a:fillRef idx="1">
+            <a:schemeClr val="accent1"/>
+          </a:fillRef>
+          <a:effectRef idx="0">
+            <a:schemeClr val="accent1"/>
+          </a:effectRef>
+          <a:fontRef idx="minor">
+            <a:schemeClr val="lt1"/>
+          </a:fontRef>
+        </p:style>
+        <p:txBody>
+          <a:bodyPr rtlCol="0" anchor="ctr"/>
+          <a:lstStyle/>
+          <a:p>
+            <a:pPr algn="ctr"/>
+            <a:endParaRPr lang="en-US"/>
+          </a:p>
+        </p:txBody>
+      </p:sp>
+    </p:spTree>
+    <p:extLst>
+      <p:ext uri="{BB962C8B-B14F-4D97-AF65-F5344CB8AC3E}">
+        <p14:creationId xmlns:p14="http://schemas.microsoft.com/office/powerpoint/2010/main" val="3164594692"/>
       </p:ext>
     </p:extLst>
   </p:cSld>
@@ -4909,12 +4985,14 @@
 </file>
 
 <file path=ppt/webextensions/webextension6.xml><?xml version="1.0" encoding="utf-8"?>
-<we:webextension xmlns:we="http://schemas.microsoft.com/office/webextensions/webextension/2010/11" id="{1B6455D8-4EA3-A340-8CD6-E45155F3CCD8}">
+<we:webextension xmlns:we="http://schemas.microsoft.com/office/webextensions/webextension/2010/11" id="{23C3EEA4-8511-EA48-861A-F1802D5535E7}">
   <we:reference id="wa104380117" version="1.0.0.0" store="en-US" storeType="OMEX"/>
   <we:alternateReferences>
     <we:reference id="wa104380117" version="1.0.0.0" store="wa104380117" storeType="OMEX"/>
   </we:alternateReferences>
-  <we:properties/>
+  <we:properties>
+    <we:property name="image_id" value="&quot;727ea727-73b6-450e-8c66-6e9913aefa91&quot;"/>
+  </we:properties>
   <we:bindings/>
   <we:snapshot xmlns:r="http://schemas.openxmlformats.org/officeDocument/2006/relationships" r:embed="rId1"/>
 </we:webextension>

</xml_diff>

<commit_message>
PolyFun h2 enrichment plots
</commit_message>
<xml_diff>
--- a/echolocatoR/images/echo_flowchart.pptx
+++ b/echolocatoR/images/echo_flowchart.pptx
@@ -198,7 +198,7 @@
           <a:p>
             <a:fld id="{9117DA4B-D188-F549-A442-E35D4CF10A4E}" type="datetimeFigureOut">
               <a:rPr lang="en-US" smtClean="0"/>
-              <a:t>8/19/19</a:t>
+              <a:t>12/2/19</a:t>
             </a:fld>
             <a:endParaRPr lang="en-US"/>
           </a:p>
@@ -697,7 +697,7 @@
           <a:p>
             <a:fld id="{8FBCCD43-9D30-C74A-A7BB-F2658EEDAEAB}" type="datetimeFigureOut">
               <a:rPr lang="en-US" smtClean="0"/>
-              <a:t>8/19/19</a:t>
+              <a:t>12/2/19</a:t>
             </a:fld>
             <a:endParaRPr lang="en-US"/>
           </a:p>
@@ -895,7 +895,7 @@
           <a:p>
             <a:fld id="{8FBCCD43-9D30-C74A-A7BB-F2658EEDAEAB}" type="datetimeFigureOut">
               <a:rPr lang="en-US" smtClean="0"/>
-              <a:t>8/19/19</a:t>
+              <a:t>12/2/19</a:t>
             </a:fld>
             <a:endParaRPr lang="en-US"/>
           </a:p>
@@ -1103,7 +1103,7 @@
           <a:p>
             <a:fld id="{8FBCCD43-9D30-C74A-A7BB-F2658EEDAEAB}" type="datetimeFigureOut">
               <a:rPr lang="en-US" smtClean="0"/>
-              <a:t>8/19/19</a:t>
+              <a:t>12/2/19</a:t>
             </a:fld>
             <a:endParaRPr lang="en-US"/>
           </a:p>
@@ -1301,7 +1301,7 @@
           <a:p>
             <a:fld id="{8FBCCD43-9D30-C74A-A7BB-F2658EEDAEAB}" type="datetimeFigureOut">
               <a:rPr lang="en-US" smtClean="0"/>
-              <a:t>8/19/19</a:t>
+              <a:t>12/2/19</a:t>
             </a:fld>
             <a:endParaRPr lang="en-US"/>
           </a:p>
@@ -1576,7 +1576,7 @@
           <a:p>
             <a:fld id="{8FBCCD43-9D30-C74A-A7BB-F2658EEDAEAB}" type="datetimeFigureOut">
               <a:rPr lang="en-US" smtClean="0"/>
-              <a:t>8/19/19</a:t>
+              <a:t>12/2/19</a:t>
             </a:fld>
             <a:endParaRPr lang="en-US"/>
           </a:p>
@@ -1841,7 +1841,7 @@
           <a:p>
             <a:fld id="{8FBCCD43-9D30-C74A-A7BB-F2658EEDAEAB}" type="datetimeFigureOut">
               <a:rPr lang="en-US" smtClean="0"/>
-              <a:t>8/19/19</a:t>
+              <a:t>12/2/19</a:t>
             </a:fld>
             <a:endParaRPr lang="en-US"/>
           </a:p>
@@ -2253,7 +2253,7 @@
           <a:p>
             <a:fld id="{8FBCCD43-9D30-C74A-A7BB-F2658EEDAEAB}" type="datetimeFigureOut">
               <a:rPr lang="en-US" smtClean="0"/>
-              <a:t>8/19/19</a:t>
+              <a:t>12/2/19</a:t>
             </a:fld>
             <a:endParaRPr lang="en-US"/>
           </a:p>
@@ -2394,7 +2394,7 @@
           <a:p>
             <a:fld id="{8FBCCD43-9D30-C74A-A7BB-F2658EEDAEAB}" type="datetimeFigureOut">
               <a:rPr lang="en-US" smtClean="0"/>
-              <a:t>8/19/19</a:t>
+              <a:t>12/2/19</a:t>
             </a:fld>
             <a:endParaRPr lang="en-US"/>
           </a:p>
@@ -2507,7 +2507,7 @@
           <a:p>
             <a:fld id="{8FBCCD43-9D30-C74A-A7BB-F2658EEDAEAB}" type="datetimeFigureOut">
               <a:rPr lang="en-US" smtClean="0"/>
-              <a:t>8/19/19</a:t>
+              <a:t>12/2/19</a:t>
             </a:fld>
             <a:endParaRPr lang="en-US"/>
           </a:p>
@@ -2818,7 +2818,7 @@
           <a:p>
             <a:fld id="{8FBCCD43-9D30-C74A-A7BB-F2658EEDAEAB}" type="datetimeFigureOut">
               <a:rPr lang="en-US" smtClean="0"/>
-              <a:t>8/19/19</a:t>
+              <a:t>12/2/19</a:t>
             </a:fld>
             <a:endParaRPr lang="en-US"/>
           </a:p>
@@ -3106,7 +3106,7 @@
           <a:p>
             <a:fld id="{8FBCCD43-9D30-C74A-A7BB-F2658EEDAEAB}" type="datetimeFigureOut">
               <a:rPr lang="en-US" smtClean="0"/>
-              <a:t>8/19/19</a:t>
+              <a:t>12/2/19</a:t>
             </a:fld>
             <a:endParaRPr lang="en-US"/>
           </a:p>
@@ -3347,7 +3347,7 @@
           <a:p>
             <a:fld id="{8FBCCD43-9D30-C74A-A7BB-F2658EEDAEAB}" type="datetimeFigureOut">
               <a:rPr lang="en-US" smtClean="0"/>
-              <a:t>8/19/19</a:t>
+              <a:t>12/2/19</a:t>
             </a:fld>
             <a:endParaRPr lang="en-US"/>
           </a:p>
@@ -4107,7 +4107,127 @@
               <p:nvPr/>
             </p:nvPicPr>
             <p:blipFill>
-              <a:blip r:embed="rId4"/>
+              <a:blip r:embed="rId11"/>
+              <a:stretch>
+                <a:fillRect/>
+              </a:stretch>
+            </p:blipFill>
+            <p:spPr>
+              <a:xfrm>
+                <a:off x="-63500" y="-1016000"/>
+                <a:ext cx="12319000" cy="8890000"/>
+              </a:xfrm>
+              <a:prstGeom prst="rect">
+                <a:avLst/>
+              </a:prstGeom>
+            </p:spPr>
+          </p:pic>
+        </mc:Fallback>
+      </mc:AlternateContent>
+      <mc:AlternateContent xmlns:mc="http://schemas.openxmlformats.org/markup-compatibility/2006">
+        <mc:Choice xmlns:we="http://schemas.microsoft.com/office/webextensions/webextension/2010/11" xmlns:pca="http://schemas.microsoft.com/office/powerpoint/2013/contentapp" Requires="we pca">
+          <p:graphicFrame>
+            <p:nvGraphicFramePr>
+              <p:cNvPr id="8" name="Add-in 7" title="Lucidchart">
+                <a:extLst>
+                  <a:ext uri="{FF2B5EF4-FFF2-40B4-BE49-F238E27FC236}">
+                    <a16:creationId xmlns:a16="http://schemas.microsoft.com/office/drawing/2014/main" id="{6519B4A5-B4B8-7144-BC6D-D89350BEB337}"/>
+                  </a:ext>
+                </a:extLst>
+              </p:cNvPr>
+              <p:cNvGraphicFramePr>
+                <a:graphicFrameLocks noGrp="1"/>
+              </p:cNvGraphicFramePr>
+              <p:nvPr/>
+            </p:nvGraphicFramePr>
+            <p:xfrm>
+              <a:off x="-63500" y="-1016000"/>
+              <a:ext cx="12319000" cy="8890000"/>
+            </p:xfrm>
+            <a:graphic>
+              <a:graphicData uri="http://schemas.microsoft.com/office/webextensions/webextension/2010/11">
+                <we:webextensionref xmlns:we="http://schemas.microsoft.com/office/webextensions/webextension/2010/11" xmlns:r="http://schemas.openxmlformats.org/officeDocument/2006/relationships" r:id="rId12"/>
+              </a:graphicData>
+            </a:graphic>
+          </p:graphicFrame>
+        </mc:Choice>
+        <mc:Fallback>
+          <p:pic>
+            <p:nvPicPr>
+              <p:cNvPr id="8" name="Add-in 7" title="Lucidchart">
+                <a:extLst>
+                  <a:ext uri="{FF2B5EF4-FFF2-40B4-BE49-F238E27FC236}">
+                    <a16:creationId xmlns:a16="http://schemas.microsoft.com/office/drawing/2014/main" id="{6519B4A5-B4B8-7144-BC6D-D89350BEB337}"/>
+                  </a:ext>
+                </a:extLst>
+              </p:cNvPr>
+              <p:cNvPicPr>
+                <a:picLocks noGrp="1" noRot="1" noChangeAspect="1" noMove="1" noResize="1" noEditPoints="1" noAdjustHandles="1" noChangeArrowheads="1" noChangeShapeType="1"/>
+              </p:cNvPicPr>
+              <p:nvPr/>
+            </p:nvPicPr>
+            <p:blipFill>
+              <a:blip r:embed="rId13"/>
+              <a:stretch>
+                <a:fillRect/>
+              </a:stretch>
+            </p:blipFill>
+            <p:spPr>
+              <a:xfrm>
+                <a:off x="-63500" y="-1016000"/>
+                <a:ext cx="12319000" cy="8890000"/>
+              </a:xfrm>
+              <a:prstGeom prst="rect">
+                <a:avLst/>
+              </a:prstGeom>
+            </p:spPr>
+          </p:pic>
+        </mc:Fallback>
+      </mc:AlternateContent>
+      <mc:AlternateContent xmlns:mc="http://schemas.openxmlformats.org/markup-compatibility/2006">
+        <mc:Choice xmlns:we="http://schemas.microsoft.com/office/webextensions/webextension/2010/11" xmlns:pca="http://schemas.microsoft.com/office/powerpoint/2013/contentapp" Requires="we pca">
+          <p:graphicFrame>
+            <p:nvGraphicFramePr>
+              <p:cNvPr id="9" name="Add-in 8" title="Lucidchart">
+                <a:extLst>
+                  <a:ext uri="{FF2B5EF4-FFF2-40B4-BE49-F238E27FC236}">
+                    <a16:creationId xmlns:a16="http://schemas.microsoft.com/office/drawing/2014/main" id="{92598E6E-6EBB-7B4E-A6A4-62C78FD419EF}"/>
+                  </a:ext>
+                </a:extLst>
+              </p:cNvPr>
+              <p:cNvGraphicFramePr>
+                <a:graphicFrameLocks noGrp="1"/>
+              </p:cNvGraphicFramePr>
+              <p:nvPr/>
+            </p:nvGraphicFramePr>
+            <p:xfrm>
+              <a:off x="-63500" y="-1016000"/>
+              <a:ext cx="12319000" cy="8890000"/>
+            </p:xfrm>
+            <a:graphic>
+              <a:graphicData uri="http://schemas.microsoft.com/office/webextensions/webextension/2010/11">
+                <we:webextensionref xmlns:we="http://schemas.microsoft.com/office/webextensions/webextension/2010/11" xmlns:r="http://schemas.openxmlformats.org/officeDocument/2006/relationships" r:id="rId14"/>
+              </a:graphicData>
+            </a:graphic>
+          </p:graphicFrame>
+        </mc:Choice>
+        <mc:Fallback>
+          <p:pic>
+            <p:nvPicPr>
+              <p:cNvPr id="9" name="Add-in 8" title="Lucidchart">
+                <a:extLst>
+                  <a:ext uri="{FF2B5EF4-FFF2-40B4-BE49-F238E27FC236}">
+                    <a16:creationId xmlns:a16="http://schemas.microsoft.com/office/drawing/2014/main" id="{92598E6E-6EBB-7B4E-A6A4-62C78FD419EF}"/>
+                  </a:ext>
+                </a:extLst>
+              </p:cNvPr>
+              <p:cNvPicPr>
+                <a:picLocks noGrp="1" noRot="1" noChangeAspect="1" noMove="1" noResize="1" noEditPoints="1" noAdjustHandles="1" noChangeArrowheads="1" noChangeShapeType="1"/>
+              </p:cNvPicPr>
+              <p:nvPr/>
+            </p:nvPicPr>
+            <p:blipFill>
+              <a:blip r:embed="rId15"/>
               <a:stretch>
                 <a:fillRect/>
               </a:stretch>
@@ -4996,4 +5116,30 @@
   <we:bindings/>
   <we:snapshot xmlns:r="http://schemas.openxmlformats.org/officeDocument/2006/relationships" r:embed="rId1"/>
 </we:webextension>
+</file>
+
+<file path=ppt/webextensions/webextension7.xml><?xml version="1.0" encoding="utf-8"?>
+<we:webextension xmlns:we="http://schemas.microsoft.com/office/webextensions/webextension/2010/11" id="{EA732801-524C-B345-B3A7-8E71DA451B78}">
+  <we:reference id="wa104380117" version="1.0.0.0" store="en-US" storeType="OMEX"/>
+  <we:alternateReferences>
+    <we:reference id="wa104380117" version="1.0.0.0" store="wa104380117" storeType="OMEX"/>
+  </we:alternateReferences>
+  <we:properties>
+    <we:property name="image_id" value="&quot;f5eb3d54-33fa-4417-aab5-30a7a7b11cf6&quot;"/>
+  </we:properties>
+  <we:bindings/>
+  <we:snapshot xmlns:r="http://schemas.openxmlformats.org/officeDocument/2006/relationships" r:embed="rId1"/>
+</we:webextension>
+</file>
+
+<file path=ppt/webextensions/webextension8.xml><?xml version="1.0" encoding="utf-8"?>
+<we:webextension xmlns:we="http://schemas.microsoft.com/office/webextensions/webextension/2010/11" id="{C517F9B2-B19D-F742-85F5-516CD7814FAC}">
+  <we:reference id="wa104380117" version="1.0.0.0" store="en-US" storeType="OMEX"/>
+  <we:alternateReferences>
+    <we:reference id="wa104380117" version="1.0.0.0" store="wa104380117" storeType="OMEX"/>
+  </we:alternateReferences>
+  <we:properties/>
+  <we:bindings/>
+  <we:snapshot xmlns:r="http://schemas.openxmlformats.org/officeDocument/2006/relationships" r:embed="rId1"/>
+</we:webextension>
 </file>
</xml_diff>

<commit_message>
Re-run echoR after fixing PolyFun resorting issue
</commit_message>
<xml_diff>
--- a/echolocatoR/images/echo_flowchart.pptx
+++ b/echolocatoR/images/echo_flowchart.pptx
@@ -198,7 +198,7 @@
           <a:p>
             <a:fld id="{9117DA4B-D188-F549-A442-E35D4CF10A4E}" type="datetimeFigureOut">
               <a:rPr lang="en-US" smtClean="0"/>
-              <a:t>12/2/19</a:t>
+              <a:t>1/13/20</a:t>
             </a:fld>
             <a:endParaRPr lang="en-US"/>
           </a:p>
@@ -697,7 +697,7 @@
           <a:p>
             <a:fld id="{8FBCCD43-9D30-C74A-A7BB-F2658EEDAEAB}" type="datetimeFigureOut">
               <a:rPr lang="en-US" smtClean="0"/>
-              <a:t>12/2/19</a:t>
+              <a:t>1/13/20</a:t>
             </a:fld>
             <a:endParaRPr lang="en-US"/>
           </a:p>
@@ -895,7 +895,7 @@
           <a:p>
             <a:fld id="{8FBCCD43-9D30-C74A-A7BB-F2658EEDAEAB}" type="datetimeFigureOut">
               <a:rPr lang="en-US" smtClean="0"/>
-              <a:t>12/2/19</a:t>
+              <a:t>1/13/20</a:t>
             </a:fld>
             <a:endParaRPr lang="en-US"/>
           </a:p>
@@ -1103,7 +1103,7 @@
           <a:p>
             <a:fld id="{8FBCCD43-9D30-C74A-A7BB-F2658EEDAEAB}" type="datetimeFigureOut">
               <a:rPr lang="en-US" smtClean="0"/>
-              <a:t>12/2/19</a:t>
+              <a:t>1/13/20</a:t>
             </a:fld>
             <a:endParaRPr lang="en-US"/>
           </a:p>
@@ -1301,7 +1301,7 @@
           <a:p>
             <a:fld id="{8FBCCD43-9D30-C74A-A7BB-F2658EEDAEAB}" type="datetimeFigureOut">
               <a:rPr lang="en-US" smtClean="0"/>
-              <a:t>12/2/19</a:t>
+              <a:t>1/13/20</a:t>
             </a:fld>
             <a:endParaRPr lang="en-US"/>
           </a:p>
@@ -1576,7 +1576,7 @@
           <a:p>
             <a:fld id="{8FBCCD43-9D30-C74A-A7BB-F2658EEDAEAB}" type="datetimeFigureOut">
               <a:rPr lang="en-US" smtClean="0"/>
-              <a:t>12/2/19</a:t>
+              <a:t>1/13/20</a:t>
             </a:fld>
             <a:endParaRPr lang="en-US"/>
           </a:p>
@@ -1841,7 +1841,7 @@
           <a:p>
             <a:fld id="{8FBCCD43-9D30-C74A-A7BB-F2658EEDAEAB}" type="datetimeFigureOut">
               <a:rPr lang="en-US" smtClean="0"/>
-              <a:t>12/2/19</a:t>
+              <a:t>1/13/20</a:t>
             </a:fld>
             <a:endParaRPr lang="en-US"/>
           </a:p>
@@ -2253,7 +2253,7 @@
           <a:p>
             <a:fld id="{8FBCCD43-9D30-C74A-A7BB-F2658EEDAEAB}" type="datetimeFigureOut">
               <a:rPr lang="en-US" smtClean="0"/>
-              <a:t>12/2/19</a:t>
+              <a:t>1/13/20</a:t>
             </a:fld>
             <a:endParaRPr lang="en-US"/>
           </a:p>
@@ -2394,7 +2394,7 @@
           <a:p>
             <a:fld id="{8FBCCD43-9D30-C74A-A7BB-F2658EEDAEAB}" type="datetimeFigureOut">
               <a:rPr lang="en-US" smtClean="0"/>
-              <a:t>12/2/19</a:t>
+              <a:t>1/13/20</a:t>
             </a:fld>
             <a:endParaRPr lang="en-US"/>
           </a:p>
@@ -2507,7 +2507,7 @@
           <a:p>
             <a:fld id="{8FBCCD43-9D30-C74A-A7BB-F2658EEDAEAB}" type="datetimeFigureOut">
               <a:rPr lang="en-US" smtClean="0"/>
-              <a:t>12/2/19</a:t>
+              <a:t>1/13/20</a:t>
             </a:fld>
             <a:endParaRPr lang="en-US"/>
           </a:p>
@@ -2818,7 +2818,7 @@
           <a:p>
             <a:fld id="{8FBCCD43-9D30-C74A-A7BB-F2658EEDAEAB}" type="datetimeFigureOut">
               <a:rPr lang="en-US" smtClean="0"/>
-              <a:t>12/2/19</a:t>
+              <a:t>1/13/20</a:t>
             </a:fld>
             <a:endParaRPr lang="en-US"/>
           </a:p>
@@ -3106,7 +3106,7 @@
           <a:p>
             <a:fld id="{8FBCCD43-9D30-C74A-A7BB-F2658EEDAEAB}" type="datetimeFigureOut">
               <a:rPr lang="en-US" smtClean="0"/>
-              <a:t>12/2/19</a:t>
+              <a:t>1/13/20</a:t>
             </a:fld>
             <a:endParaRPr lang="en-US"/>
           </a:p>
@@ -3347,7 +3347,7 @@
           <a:p>
             <a:fld id="{8FBCCD43-9D30-C74A-A7BB-F2658EEDAEAB}" type="datetimeFigureOut">
               <a:rPr lang="en-US" smtClean="0"/>
-              <a:t>12/2/19</a:t>
+              <a:t>1/13/20</a:t>
             </a:fld>
             <a:endParaRPr lang="en-US"/>
           </a:p>
@@ -4107,7 +4107,7 @@
               <p:nvPr/>
             </p:nvPicPr>
             <p:blipFill>
-              <a:blip r:embed="rId11"/>
+              <a:blip r:embed="rId4"/>
               <a:stretch>
                 <a:fillRect/>
               </a:stretch>
@@ -4146,7 +4146,7 @@
             </p:xfrm>
             <a:graphic>
               <a:graphicData uri="http://schemas.microsoft.com/office/webextensions/webextension/2010/11">
-                <we:webextensionref xmlns:we="http://schemas.microsoft.com/office/webextensions/webextension/2010/11" xmlns:r="http://schemas.openxmlformats.org/officeDocument/2006/relationships" r:id="rId12"/>
+                <we:webextensionref xmlns:we="http://schemas.microsoft.com/office/webextensions/webextension/2010/11" xmlns:r="http://schemas.openxmlformats.org/officeDocument/2006/relationships" r:id="rId11"/>
               </a:graphicData>
             </a:graphic>
           </p:graphicFrame>
@@ -4167,7 +4167,7 @@
               <p:nvPr/>
             </p:nvPicPr>
             <p:blipFill>
-              <a:blip r:embed="rId13"/>
+              <a:blip r:embed="rId12"/>
               <a:stretch>
                 <a:fillRect/>
               </a:stretch>
@@ -4206,7 +4206,7 @@
             </p:xfrm>
             <a:graphic>
               <a:graphicData uri="http://schemas.microsoft.com/office/webextensions/webextension/2010/11">
-                <we:webextensionref xmlns:we="http://schemas.microsoft.com/office/webextensions/webextension/2010/11" xmlns:r="http://schemas.openxmlformats.org/officeDocument/2006/relationships" r:id="rId14"/>
+                <we:webextensionref xmlns:we="http://schemas.microsoft.com/office/webextensions/webextension/2010/11" xmlns:r="http://schemas.openxmlformats.org/officeDocument/2006/relationships" r:id="rId13"/>
               </a:graphicData>
             </a:graphic>
           </p:graphicFrame>
@@ -4227,7 +4227,7 @@
               <p:nvPr/>
             </p:nvPicPr>
             <p:blipFill>
-              <a:blip r:embed="rId15"/>
+              <a:blip r:embed="rId14"/>
               <a:stretch>
                 <a:fillRect/>
               </a:stretch>
@@ -5138,7 +5138,9 @@
   <we:alternateReferences>
     <we:reference id="wa104380117" version="1.0.0.0" store="wa104380117" storeType="OMEX"/>
   </we:alternateReferences>
-  <we:properties/>
+  <we:properties>
+    <we:property name="image_id" value="&quot;f5eb3d54-33fa-4417-aab5-30a7a7b11cf6&quot;"/>
+  </we:properties>
   <we:bindings/>
   <we:snapshot xmlns:r="http://schemas.openxmlformats.org/officeDocument/2006/relationships" r:embed="rId1"/>
 </we:webextension>

</xml_diff>